<commit_message>
presentation, rapport, problog model
TODO: possible score strategy
TODO: bug in query(score(1,Score)), probabilities don't add up to 1.
</commit_message>
<xml_diff>
--- a/thesis/presentations/first/Probleemstellingv2.pptx
+++ b/thesis/presentations/first/Probleemstellingv2.pptx
@@ -122,7 +122,7 @@
   </p:defaultTextStyle>
   <p:extLst>
     <p:ext uri="{EFAFB233-063F-42B5-8137-9DF3F51BA10A}">
-      <p15:sldGuideLst xmlns:p15="http://schemas.microsoft.com/office/powerpoint/2012/main" xmlns="">
+      <p15:sldGuideLst xmlns="" xmlns:p15="http://schemas.microsoft.com/office/powerpoint/2012/main">
         <p15:guide id="1" orient="horz" pos="2160" userDrawn="1">
           <p15:clr>
             <a:srgbClr val="A4A3A4"/>
@@ -221,7 +221,7 @@
           <a:p>
             <a:fld id="{D6D09D9E-0F22-44ED-B43C-3F44EA87E898}" type="datetimeFigureOut">
               <a:rPr lang="en-US" smtClean="0"/>
-              <a:t>26-Oct-17</a:t>
+              <a:t>27-Oct-17</a:t>
             </a:fld>
             <a:endParaRPr lang="en-US"/>
           </a:p>
@@ -386,7 +386,7 @@
           <a:p>
             <a:fld id="{554F67E3-005B-4A5B-A64B-4E620D6532D3}" type="datetimeFigureOut">
               <a:rPr lang="nl-NL" smtClean="0"/>
-              <a:t>26-10-2017</a:t>
+              <a:t>27-10-2017</a:t>
             </a:fld>
             <a:endParaRPr lang="nl-NL"/>
           </a:p>
@@ -1703,13 +1703,12 @@
             </a:r>
             <a:r>
               <a:rPr lang="en-US" baseline="0" dirty="0" err="1" smtClean="0"/>
-              <a:t>onderstuend</a:t>
+              <a:t>ondersteund</a:t>
             </a:r>
             <a:r>
               <a:rPr lang="en-US" baseline="0" dirty="0" smtClean="0"/>
               <a:t>.</a:t>
             </a:r>
-            <a:endParaRPr lang="en-US" baseline="0" dirty="0" smtClean="0"/>
           </a:p>
           <a:p>
             <a:r>
@@ -2961,19 +2960,7 @@
                 <a:ea typeface="+mn-ea"/>
                 <a:cs typeface="+mn-cs"/>
               </a:rPr>
-              <a:t>Het </a:t>
-            </a:r>
-            <a:r>
-              <a:rPr lang="nl-BE" sz="1200" kern="1200" dirty="0" smtClean="0">
-                <a:solidFill>
-                  <a:schemeClr val="tx1"/>
-                </a:solidFill>
-                <a:effectLst/>
-                <a:latin typeface="+mn-lt"/>
-                <a:ea typeface="+mn-ea"/>
-                <a:cs typeface="+mn-cs"/>
-              </a:rPr>
-              <a:t>spel bestaat uit een bord van 10 op 10 blokken. Wanneer het spel gestart wordt krijgen de blokken een random kleur toegewezen (uniforme distributie). Er zijn 4 kleuren in totaal: rood, groen, geel, blauw.</a:t>
+              <a:t>Het spel bestaat uit een bord van 10 op 10 blokken. Wanneer het spel gestart wordt krijgen de blokken een random kleur toegewezen (uniforme distributie). Er zijn 4 kleuren in totaal: rood, groen, geel, blauw.</a:t>
             </a:r>
             <a:endParaRPr lang="en-US" dirty="0"/>
           </a:p>
@@ -4258,7 +4245,7 @@
   </p:clrMapOvr>
   <p:extLst mod="1">
     <p:ext uri="{DCECCB84-F9BA-43D5-87BE-67443E8EF086}">
-      <p15:sldGuideLst xmlns:p15="http://schemas.microsoft.com/office/powerpoint/2012/main" xmlns="">
+      <p15:sldGuideLst xmlns="" xmlns:p15="http://schemas.microsoft.com/office/powerpoint/2012/main">
         <p15:guide id="1" orient="horz" pos="3929" userDrawn="1">
           <p15:clr>
             <a:srgbClr val="FBAE40"/>
@@ -4569,7 +4556,7 @@
   </p:clrMapOvr>
   <p:extLst mod="1">
     <p:ext uri="{DCECCB84-F9BA-43D5-87BE-67443E8EF086}">
-      <p15:sldGuideLst xmlns:p15="http://schemas.microsoft.com/office/powerpoint/2012/main" xmlns="">
+      <p15:sldGuideLst xmlns="" xmlns:p15="http://schemas.microsoft.com/office/powerpoint/2012/main">
         <p15:guide id="1" orient="horz" pos="3929">
           <p15:clr>
             <a:srgbClr val="FBAE40"/>
@@ -4857,7 +4844,7 @@
           <a:p>
             <a:fld id="{BA252000-72D1-4588-81D0-A21B268C4F60}" type="datetime1">
               <a:rPr lang="nl-BE" smtClean="0"/>
-              <a:t>26/10/2017</a:t>
+              <a:t>27/10/2017</a:t>
             </a:fld>
             <a:endParaRPr lang="nl-NL" dirty="0"/>
           </a:p>
@@ -4922,7 +4909,7 @@
   </p:clrMapOvr>
   <p:extLst mod="1">
     <p:ext uri="{DCECCB84-F9BA-43D5-87BE-67443E8EF086}">
-      <p15:sldGuideLst xmlns:p15="http://schemas.microsoft.com/office/powerpoint/2012/main" xmlns="">
+      <p15:sldGuideLst xmlns="" xmlns:p15="http://schemas.microsoft.com/office/powerpoint/2012/main">
         <p15:guide id="1" orient="horz" pos="2160">
           <p15:clr>
             <a:srgbClr val="FBAE40"/>
@@ -5164,7 +5151,7 @@
           <a:p>
             <a:fld id="{51B5EE41-54AE-48CB-8D18-4748453B9BC8}" type="datetime1">
               <a:rPr lang="nl-BE" smtClean="0"/>
-              <a:t>26/10/2017</a:t>
+              <a:t>27/10/2017</a:t>
             </a:fld>
             <a:endParaRPr lang="nl-NL" dirty="0"/>
           </a:p>
@@ -5229,7 +5216,7 @@
   </p:clrMapOvr>
   <p:extLst mod="1">
     <p:ext uri="{DCECCB84-F9BA-43D5-87BE-67443E8EF086}">
-      <p15:sldGuideLst xmlns:p15="http://schemas.microsoft.com/office/powerpoint/2012/main" xmlns="">
+      <p15:sldGuideLst xmlns="" xmlns:p15="http://schemas.microsoft.com/office/powerpoint/2012/main">
         <p15:guide id="1" orient="horz" pos="2160">
           <p15:clr>
             <a:srgbClr val="FBAE40"/>
@@ -5280,7 +5267,7 @@
           <a:p>
             <a:fld id="{325CFB26-3E0B-43F3-B1DB-8FF4C39B3D0D}" type="datetime1">
               <a:rPr lang="nl-BE" smtClean="0"/>
-              <a:t>26/10/2017</a:t>
+              <a:t>27/10/2017</a:t>
             </a:fld>
             <a:endParaRPr lang="nl-NL" dirty="0"/>
           </a:p>
@@ -5670,7 +5657,7 @@
           <a:p>
             <a:fld id="{DC4FC34B-922A-43D1-878B-5EF44FE511A8}" type="datetime1">
               <a:rPr lang="nl-BE" smtClean="0"/>
-              <a:t>26/10/2017</a:t>
+              <a:t>27/10/2017</a:t>
             </a:fld>
             <a:endParaRPr lang="nl-NL" dirty="0"/>
           </a:p>
@@ -5789,7 +5776,7 @@
   </p:clrMapOvr>
   <p:extLst mod="1">
     <p:ext uri="{DCECCB84-F9BA-43D5-87BE-67443E8EF086}">
-      <p15:sldGuideLst xmlns:p15="http://schemas.microsoft.com/office/powerpoint/2012/main" xmlns="">
+      <p15:sldGuideLst xmlns="" xmlns:p15="http://schemas.microsoft.com/office/powerpoint/2012/main">
         <p15:guide id="1" orient="horz" pos="2160" userDrawn="1">
           <p15:clr>
             <a:srgbClr val="FBAE40"/>
@@ -6001,7 +5988,7 @@
           <a:p>
             <a:fld id="{FD918A91-1924-4471-9808-ACB04D0ED8EA}" type="datetime1">
               <a:rPr lang="nl-BE" smtClean="0"/>
-              <a:t>26/10/2017</a:t>
+              <a:t>27/10/2017</a:t>
             </a:fld>
             <a:endParaRPr lang="nl-NL" dirty="0"/>
           </a:p>
@@ -6120,7 +6107,7 @@
   </p:clrMapOvr>
   <p:extLst mod="1">
     <p:ext uri="{DCECCB84-F9BA-43D5-87BE-67443E8EF086}">
-      <p15:sldGuideLst xmlns:p15="http://schemas.microsoft.com/office/powerpoint/2012/main" xmlns="">
+      <p15:sldGuideLst xmlns="" xmlns:p15="http://schemas.microsoft.com/office/powerpoint/2012/main">
         <p15:guide id="1" orient="horz" pos="2160" userDrawn="1">
           <p15:clr>
             <a:srgbClr val="FBAE40"/>
@@ -6291,7 +6278,7 @@
           <a:p>
             <a:fld id="{EA5FBAB9-5FA3-46D6-A3EF-8850D13E3E94}" type="datetime1">
               <a:rPr lang="nl-BE" smtClean="0"/>
-              <a:t>26/10/2017</a:t>
+              <a:t>27/10/2017</a:t>
             </a:fld>
             <a:endParaRPr lang="nl-NL" dirty="0"/>
           </a:p>
@@ -6670,7 +6657,7 @@
           <a:p>
             <a:fld id="{D02784A5-45C8-4246-ADE0-8842E3C66E5D}" type="datetime1">
               <a:rPr lang="nl-BE" smtClean="0"/>
-              <a:t>26/10/2017</a:t>
+              <a:t>27/10/2017</a:t>
             </a:fld>
             <a:endParaRPr lang="nl-NL" dirty="0"/>
           </a:p>
@@ -6793,7 +6780,7 @@
           <a:p>
             <a:fld id="{C477E6CE-7017-4F77-9645-5F8638D9B9E2}" type="datetime1">
               <a:rPr lang="nl-BE" smtClean="0"/>
-              <a:t>26/10/2017</a:t>
+              <a:t>27/10/2017</a:t>
             </a:fld>
             <a:endParaRPr lang="nl-NL" dirty="0"/>
           </a:p>
@@ -6916,7 +6903,7 @@
           <a:p>
             <a:fld id="{56055E81-6827-4C1D-AD12-F50C5BE907ED}" type="datetime1">
               <a:rPr lang="nl-BE" smtClean="0"/>
-              <a:t>26/10/2017</a:t>
+              <a:t>27/10/2017</a:t>
             </a:fld>
             <a:endParaRPr lang="nl-NL" dirty="0"/>
           </a:p>
@@ -7065,7 +7052,7 @@
           <a:p>
             <a:fld id="{F7042BA5-0515-4B7F-B8A4-B74FD521147B}" type="datetime1">
               <a:rPr lang="nl-BE" smtClean="0"/>
-              <a:t>26/10/2017</a:t>
+              <a:t>27/10/2017</a:t>
             </a:fld>
             <a:endParaRPr lang="nl-NL" dirty="0"/>
           </a:p>
@@ -7233,7 +7220,7 @@
           <a:p>
             <a:fld id="{09EF3F9E-B585-4D67-B28C-5D7ABCECB608}" type="datetime1">
               <a:rPr lang="nl-BE" smtClean="0"/>
-              <a:t>26/10/2017</a:t>
+              <a:t>27/10/2017</a:t>
             </a:fld>
             <a:endParaRPr lang="nl-NL" dirty="0"/>
           </a:p>
@@ -7747,7 +7734,7 @@
   </p:txStyles>
   <p:extLst mod="1">
     <p:ext uri="{27BBF7A9-308A-43DC-89C8-2F10F3537804}">
-      <p15:sldGuideLst xmlns:p15="http://schemas.microsoft.com/office/powerpoint/2012/main" xmlns="">
+      <p15:sldGuideLst xmlns="" xmlns:p15="http://schemas.microsoft.com/office/powerpoint/2012/main">
         <p15:guide id="1" orient="horz" pos="3816" userDrawn="1">
           <p15:clr>
             <a:srgbClr val="F26B43"/>
@@ -7871,7 +7858,7 @@
           <a:p>
             <a:fld id="{15BE6352-CF92-4CB8-B2C0-9F716CAEF608}" type="datetime1">
               <a:rPr lang="nl-BE" smtClean="0"/>
-              <a:t>26/10/2017</a:t>
+              <a:t>27/10/2017</a:t>
             </a:fld>
             <a:endParaRPr lang="nl-NL" dirty="0"/>
           </a:p>
@@ -8379,7 +8366,7 @@
   </p:txStyles>
   <p:extLst mod="1">
     <p:ext uri="{27BBF7A9-308A-43DC-89C8-2F10F3537804}">
-      <p15:sldGuideLst xmlns:p15="http://schemas.microsoft.com/office/powerpoint/2012/main" xmlns="">
+      <p15:sldGuideLst xmlns="" xmlns:p15="http://schemas.microsoft.com/office/powerpoint/2012/main">
         <p15:guide id="1" orient="horz" pos="1026" userDrawn="1">
           <p15:clr>
             <a:srgbClr val="F26B43"/>
@@ -11670,11 +11657,7 @@
             <a:pPr lvl="1"/>
             <a:r>
               <a:rPr lang="en-US" dirty="0" smtClean="0"/>
-              <a:t>Blok(X, Y</a:t>
-            </a:r>
-            <a:r>
-              <a:rPr lang="en-US" dirty="0" smtClean="0"/>
-              <a:t>)</a:t>
+              <a:t>Blok(X, Y)</a:t>
             </a:r>
           </a:p>
           <a:p>
@@ -12315,7 +12298,7 @@
   <a:extraClrSchemeLst/>
   <a:extLst>
     <a:ext uri="{05A4C25C-085E-4340-85A3-A5531E510DB2}">
-      <thm15:themeFamily xmlns:thm15="http://schemas.microsoft.com/office/thememl/2012/main" xmlns="" name="Office Theme" id="{62F939B6-93AF-4DB8-9C6B-D6C7DFDC589F}" vid="{4A3C46E8-61CC-4603-A589-7422A47A8E4A}"/>
+      <thm15:themeFamily xmlns="" xmlns:thm15="http://schemas.microsoft.com/office/thememl/2012/main" name="Office Theme" id="{62F939B6-93AF-4DB8-9C6B-D6C7DFDC589F}" vid="{4A3C46E8-61CC-4603-A589-7422A47A8E4A}"/>
     </a:ext>
   </a:extLst>
 </a:theme>
@@ -12576,7 +12559,7 @@
   <a:extraClrSchemeLst/>
   <a:extLst>
     <a:ext uri="{05A4C25C-085E-4340-85A3-A5531E510DB2}">
-      <thm15:themeFamily xmlns:thm15="http://schemas.microsoft.com/office/thememl/2012/main" xmlns="" name="Office Theme" id="{62F939B6-93AF-4DB8-9C6B-D6C7DFDC589F}" vid="{4A3C46E8-61CC-4603-A589-7422A47A8E4A}"/>
+      <thm15:themeFamily xmlns="" xmlns:thm15="http://schemas.microsoft.com/office/thememl/2012/main" name="Office Theme" id="{62F939B6-93AF-4DB8-9C6B-D6C7DFDC589F}" vid="{4A3C46E8-61CC-4603-A589-7422A47A8E4A}"/>
     </a:ext>
   </a:extLst>
 </a:theme>
@@ -12837,7 +12820,7 @@
   <a:extraClrSchemeLst/>
   <a:extLst>
     <a:ext uri="{05A4C25C-085E-4340-85A3-A5531E510DB2}">
-      <thm15:themeFamily xmlns:thm15="http://schemas.microsoft.com/office/thememl/2012/main" xmlns="" name="Office Theme" id="{62F939B6-93AF-4DB8-9C6B-D6C7DFDC589F}" vid="{4A3C46E8-61CC-4603-A589-7422A47A8E4A}"/>
+      <thm15:themeFamily xmlns="" xmlns:thm15="http://schemas.microsoft.com/office/thememl/2012/main" name="Office Theme" id="{62F939B6-93AF-4DB8-9C6B-D6C7DFDC589F}" vid="{4A3C46E8-61CC-4603-A589-7422A47A8E4A}"/>
     </a:ext>
   </a:extLst>
 </a:theme>

</xml_diff>

<commit_message>
Learning Anglican using leiningen and Clojure projects + Bug in ProbLog change_color predicate + Some thesis tekst
Created some text for the game and for Probabilistic Programming Languages
change_color should also have a time step, otherwise probabilities go to 0 when querying for 2 time steps
Anglican project created and played a little with the syntax, different inference methods and different distributions
</commit_message>
<xml_diff>
--- a/thesis/presentations/first/Probleemstellingv2.pptx
+++ b/thesis/presentations/first/Probleemstellingv2.pptx
@@ -122,7 +122,7 @@
   </p:defaultTextStyle>
   <p:extLst>
     <p:ext uri="{EFAFB233-063F-42B5-8137-9DF3F51BA10A}">
-      <p15:sldGuideLst xmlns="" xmlns:p15="http://schemas.microsoft.com/office/powerpoint/2012/main">
+      <p15:sldGuideLst xmlns:p15="http://schemas.microsoft.com/office/powerpoint/2012/main" xmlns="">
         <p15:guide id="1" orient="horz" pos="2160" userDrawn="1">
           <p15:clr>
             <a:srgbClr val="A4A3A4"/>
@@ -221,7 +221,7 @@
           <a:p>
             <a:fld id="{D6D09D9E-0F22-44ED-B43C-3F44EA87E898}" type="datetimeFigureOut">
               <a:rPr lang="en-US" smtClean="0"/>
-              <a:t>27-Oct-17</a:t>
+              <a:t>18-Nov-17</a:t>
             </a:fld>
             <a:endParaRPr lang="en-US"/>
           </a:p>
@@ -386,7 +386,7 @@
           <a:p>
             <a:fld id="{554F67E3-005B-4A5B-A64B-4E620D6532D3}" type="datetimeFigureOut">
               <a:rPr lang="nl-NL" smtClean="0"/>
-              <a:t>27-10-2017</a:t>
+              <a:t>18-11-2017</a:t>
             </a:fld>
             <a:endParaRPr lang="nl-NL"/>
           </a:p>
@@ -900,14 +900,410 @@
               <a:defRPr/>
             </a:pPr>
             <a:r>
-              <a:rPr lang="en-US" smtClean="0"/>
-              <a:t>Omdat mijn thesis een case study is</a:t>
-            </a:r>
-            <a:r>
-              <a:rPr lang="en-US" baseline="0" smtClean="0"/>
-              <a:t> om PPL’s te evalueren en te vergelijken, is het meer naar de praktische kant gericht. Ik ben niet van plan om verschillende inferentiemethodes te vergelijken. Mijn doel is om PPL’s te vergelijken aan de hand van deze case study. De theorie over de inferentiemethodes en concepten gebruik ik als bewijsmateriaal voor de hypothese van de case study. Maar omdat dit een evaluatie is op de PPL’s en niet de inferentiemethodes kan het zijn dat de hypothese kan veranderen naar gelang de uitkomst van de evaluatie criteria.</a:t>
-            </a:r>
-            <a:endParaRPr lang="en-US" smtClean="0"/>
+              <a:rPr lang="en-US" dirty="0" err="1" smtClean="0"/>
+              <a:t>Omdat</a:t>
+            </a:r>
+            <a:r>
+              <a:rPr lang="en-US" dirty="0" smtClean="0"/>
+              <a:t> </a:t>
+            </a:r>
+            <a:r>
+              <a:rPr lang="en-US" dirty="0" err="1" smtClean="0"/>
+              <a:t>mijn</a:t>
+            </a:r>
+            <a:r>
+              <a:rPr lang="en-US" dirty="0" smtClean="0"/>
+              <a:t> thesis </a:t>
+            </a:r>
+            <a:r>
+              <a:rPr lang="en-US" dirty="0" err="1" smtClean="0"/>
+              <a:t>een</a:t>
+            </a:r>
+            <a:r>
+              <a:rPr lang="en-US" dirty="0" smtClean="0"/>
+              <a:t> case study is</a:t>
+            </a:r>
+            <a:r>
+              <a:rPr lang="en-US" baseline="0" dirty="0" smtClean="0"/>
+              <a:t> </a:t>
+            </a:r>
+            <a:r>
+              <a:rPr lang="en-US" baseline="0" dirty="0" err="1" smtClean="0"/>
+              <a:t>om</a:t>
+            </a:r>
+            <a:r>
+              <a:rPr lang="en-US" baseline="0" dirty="0" smtClean="0"/>
+              <a:t> PPL’s </a:t>
+            </a:r>
+            <a:r>
+              <a:rPr lang="en-US" baseline="0" dirty="0" err="1" smtClean="0"/>
+              <a:t>te</a:t>
+            </a:r>
+            <a:r>
+              <a:rPr lang="en-US" baseline="0" dirty="0" smtClean="0"/>
+              <a:t> </a:t>
+            </a:r>
+            <a:r>
+              <a:rPr lang="en-US" baseline="0" dirty="0" err="1" smtClean="0"/>
+              <a:t>evalueren</a:t>
+            </a:r>
+            <a:r>
+              <a:rPr lang="en-US" baseline="0" dirty="0" smtClean="0"/>
+              <a:t> en </a:t>
+            </a:r>
+            <a:r>
+              <a:rPr lang="en-US" baseline="0" dirty="0" err="1" smtClean="0"/>
+              <a:t>te</a:t>
+            </a:r>
+            <a:r>
+              <a:rPr lang="en-US" baseline="0" dirty="0" smtClean="0"/>
+              <a:t> </a:t>
+            </a:r>
+            <a:r>
+              <a:rPr lang="en-US" baseline="0" dirty="0" err="1" smtClean="0"/>
+              <a:t>vergelijken</a:t>
+            </a:r>
+            <a:r>
+              <a:rPr lang="en-US" baseline="0" dirty="0" smtClean="0"/>
+              <a:t>, is het </a:t>
+            </a:r>
+            <a:r>
+              <a:rPr lang="en-US" baseline="0" dirty="0" err="1" smtClean="0"/>
+              <a:t>meer</a:t>
+            </a:r>
+            <a:r>
+              <a:rPr lang="en-US" baseline="0" dirty="0" smtClean="0"/>
+              <a:t> </a:t>
+            </a:r>
+            <a:r>
+              <a:rPr lang="en-US" baseline="0" dirty="0" err="1" smtClean="0"/>
+              <a:t>naar</a:t>
+            </a:r>
+            <a:r>
+              <a:rPr lang="en-US" baseline="0" dirty="0" smtClean="0"/>
+              <a:t> de </a:t>
+            </a:r>
+            <a:r>
+              <a:rPr lang="en-US" baseline="0" dirty="0" err="1" smtClean="0"/>
+              <a:t>praktische</a:t>
+            </a:r>
+            <a:r>
+              <a:rPr lang="en-US" baseline="0" dirty="0" smtClean="0"/>
+              <a:t> </a:t>
+            </a:r>
+            <a:r>
+              <a:rPr lang="en-US" baseline="0" dirty="0" err="1" smtClean="0"/>
+              <a:t>kant</a:t>
+            </a:r>
+            <a:r>
+              <a:rPr lang="en-US" baseline="0" dirty="0" smtClean="0"/>
+              <a:t> </a:t>
+            </a:r>
+            <a:r>
+              <a:rPr lang="en-US" baseline="0" dirty="0" err="1" smtClean="0"/>
+              <a:t>gericht</a:t>
+            </a:r>
+            <a:r>
+              <a:rPr lang="en-US" baseline="0" dirty="0" smtClean="0"/>
+              <a:t>. </a:t>
+            </a:r>
+            <a:r>
+              <a:rPr lang="en-US" baseline="0" dirty="0" err="1" smtClean="0"/>
+              <a:t>Ik</a:t>
+            </a:r>
+            <a:r>
+              <a:rPr lang="en-US" baseline="0" dirty="0" smtClean="0"/>
+              <a:t> ben </a:t>
+            </a:r>
+            <a:r>
+              <a:rPr lang="en-US" baseline="0" dirty="0" err="1" smtClean="0"/>
+              <a:t>niet</a:t>
+            </a:r>
+            <a:r>
+              <a:rPr lang="en-US" baseline="0" dirty="0" smtClean="0"/>
+              <a:t> van plan </a:t>
+            </a:r>
+            <a:r>
+              <a:rPr lang="en-US" baseline="0" dirty="0" err="1" smtClean="0"/>
+              <a:t>om</a:t>
+            </a:r>
+            <a:r>
+              <a:rPr lang="en-US" baseline="0" dirty="0" smtClean="0"/>
+              <a:t> </a:t>
+            </a:r>
+            <a:r>
+              <a:rPr lang="en-US" baseline="0" dirty="0" err="1" smtClean="0"/>
+              <a:t>verschillende</a:t>
+            </a:r>
+            <a:r>
+              <a:rPr lang="en-US" baseline="0" dirty="0" smtClean="0"/>
+              <a:t> </a:t>
+            </a:r>
+            <a:r>
+              <a:rPr lang="en-US" baseline="0" dirty="0" err="1" smtClean="0"/>
+              <a:t>inferentiemethodes</a:t>
+            </a:r>
+            <a:r>
+              <a:rPr lang="en-US" baseline="0" dirty="0" smtClean="0"/>
+              <a:t> </a:t>
+            </a:r>
+            <a:r>
+              <a:rPr lang="en-US" baseline="0" dirty="0" err="1" smtClean="0"/>
+              <a:t>te</a:t>
+            </a:r>
+            <a:r>
+              <a:rPr lang="en-US" baseline="0" dirty="0" smtClean="0"/>
+              <a:t> </a:t>
+            </a:r>
+            <a:r>
+              <a:rPr lang="en-US" baseline="0" dirty="0" err="1" smtClean="0"/>
+              <a:t>vergelijken</a:t>
+            </a:r>
+            <a:r>
+              <a:rPr lang="en-US" baseline="0" dirty="0" smtClean="0"/>
+              <a:t>. </a:t>
+            </a:r>
+            <a:r>
+              <a:rPr lang="en-US" baseline="0" dirty="0" err="1" smtClean="0"/>
+              <a:t>Mijn</a:t>
+            </a:r>
+            <a:r>
+              <a:rPr lang="en-US" baseline="0" dirty="0" smtClean="0"/>
+              <a:t> </a:t>
+            </a:r>
+            <a:r>
+              <a:rPr lang="en-US" baseline="0" dirty="0" err="1" smtClean="0"/>
+              <a:t>doel</a:t>
+            </a:r>
+            <a:r>
+              <a:rPr lang="en-US" baseline="0" dirty="0" smtClean="0"/>
+              <a:t> is </a:t>
+            </a:r>
+            <a:r>
+              <a:rPr lang="en-US" baseline="0" dirty="0" err="1" smtClean="0"/>
+              <a:t>om</a:t>
+            </a:r>
+            <a:r>
+              <a:rPr lang="en-US" baseline="0" dirty="0" smtClean="0"/>
+              <a:t> PPL’s </a:t>
+            </a:r>
+            <a:r>
+              <a:rPr lang="en-US" baseline="0" dirty="0" err="1" smtClean="0"/>
+              <a:t>te</a:t>
+            </a:r>
+            <a:r>
+              <a:rPr lang="en-US" baseline="0" dirty="0" smtClean="0"/>
+              <a:t> </a:t>
+            </a:r>
+            <a:r>
+              <a:rPr lang="en-US" baseline="0" dirty="0" err="1" smtClean="0"/>
+              <a:t>vergelijken</a:t>
+            </a:r>
+            <a:r>
+              <a:rPr lang="en-US" baseline="0" dirty="0" smtClean="0"/>
+              <a:t> aan de hand van </a:t>
+            </a:r>
+            <a:r>
+              <a:rPr lang="en-US" baseline="0" dirty="0" err="1" smtClean="0"/>
+              <a:t>deze</a:t>
+            </a:r>
+            <a:r>
+              <a:rPr lang="en-US" baseline="0" dirty="0" smtClean="0"/>
+              <a:t> case study. De </a:t>
+            </a:r>
+            <a:r>
+              <a:rPr lang="en-US" baseline="0" dirty="0" err="1" smtClean="0"/>
+              <a:t>theorie</a:t>
+            </a:r>
+            <a:r>
+              <a:rPr lang="en-US" baseline="0" dirty="0" smtClean="0"/>
+              <a:t> over de </a:t>
+            </a:r>
+            <a:r>
+              <a:rPr lang="en-US" baseline="0" dirty="0" err="1" smtClean="0"/>
+              <a:t>inferentiemethodes</a:t>
+            </a:r>
+            <a:r>
+              <a:rPr lang="en-US" baseline="0" dirty="0" smtClean="0"/>
+              <a:t> en </a:t>
+            </a:r>
+            <a:r>
+              <a:rPr lang="en-US" baseline="0" dirty="0" err="1" smtClean="0"/>
+              <a:t>concepten</a:t>
+            </a:r>
+            <a:r>
+              <a:rPr lang="en-US" baseline="0" dirty="0" smtClean="0"/>
+              <a:t> </a:t>
+            </a:r>
+            <a:r>
+              <a:rPr lang="en-US" baseline="0" dirty="0" err="1" smtClean="0"/>
+              <a:t>gebruik</a:t>
+            </a:r>
+            <a:r>
+              <a:rPr lang="en-US" baseline="0" dirty="0" smtClean="0"/>
+              <a:t> </a:t>
+            </a:r>
+            <a:r>
+              <a:rPr lang="en-US" baseline="0" dirty="0" err="1" smtClean="0"/>
+              <a:t>ik</a:t>
+            </a:r>
+            <a:r>
+              <a:rPr lang="en-US" baseline="0" dirty="0" smtClean="0"/>
+              <a:t> als </a:t>
+            </a:r>
+            <a:r>
+              <a:rPr lang="en-US" baseline="0" dirty="0" err="1" smtClean="0"/>
+              <a:t>bewijsmateriaal</a:t>
+            </a:r>
+            <a:r>
+              <a:rPr lang="en-US" baseline="0" dirty="0" smtClean="0"/>
+              <a:t> </a:t>
+            </a:r>
+            <a:r>
+              <a:rPr lang="en-US" baseline="0" dirty="0" err="1" smtClean="0"/>
+              <a:t>voor</a:t>
+            </a:r>
+            <a:r>
+              <a:rPr lang="en-US" baseline="0" dirty="0" smtClean="0"/>
+              <a:t> de </a:t>
+            </a:r>
+            <a:r>
+              <a:rPr lang="en-US" baseline="0" dirty="0" err="1" smtClean="0"/>
+              <a:t>hypothese</a:t>
+            </a:r>
+            <a:r>
+              <a:rPr lang="en-US" baseline="0" dirty="0" smtClean="0"/>
+              <a:t> van de case study. Maar </a:t>
+            </a:r>
+            <a:r>
+              <a:rPr lang="en-US" baseline="0" dirty="0" err="1" smtClean="0"/>
+              <a:t>omdat</a:t>
+            </a:r>
+            <a:r>
+              <a:rPr lang="en-US" baseline="0" dirty="0" smtClean="0"/>
+              <a:t> </a:t>
+            </a:r>
+            <a:r>
+              <a:rPr lang="en-US" baseline="0" dirty="0" err="1" smtClean="0"/>
+              <a:t>dit</a:t>
+            </a:r>
+            <a:r>
+              <a:rPr lang="en-US" baseline="0" dirty="0" smtClean="0"/>
+              <a:t> </a:t>
+            </a:r>
+            <a:r>
+              <a:rPr lang="en-US" baseline="0" dirty="0" err="1" smtClean="0"/>
+              <a:t>een</a:t>
+            </a:r>
+            <a:r>
+              <a:rPr lang="en-US" baseline="0" dirty="0" smtClean="0"/>
+              <a:t> </a:t>
+            </a:r>
+            <a:r>
+              <a:rPr lang="en-US" baseline="0" dirty="0" err="1" smtClean="0"/>
+              <a:t>evaluatie</a:t>
+            </a:r>
+            <a:r>
+              <a:rPr lang="en-US" baseline="0" dirty="0" smtClean="0"/>
+              <a:t> is op de PPL’s en </a:t>
+            </a:r>
+            <a:r>
+              <a:rPr lang="en-US" baseline="0" dirty="0" err="1" smtClean="0"/>
+              <a:t>niet</a:t>
+            </a:r>
+            <a:r>
+              <a:rPr lang="en-US" baseline="0" dirty="0" smtClean="0"/>
+              <a:t> de </a:t>
+            </a:r>
+            <a:r>
+              <a:rPr lang="en-US" baseline="0" dirty="0" err="1" smtClean="0"/>
+              <a:t>inferentiemethodes</a:t>
+            </a:r>
+            <a:r>
+              <a:rPr lang="en-US" baseline="0" dirty="0" smtClean="0"/>
+              <a:t> </a:t>
+            </a:r>
+            <a:r>
+              <a:rPr lang="en-US" baseline="0" dirty="0" err="1" smtClean="0"/>
+              <a:t>kan</a:t>
+            </a:r>
+            <a:r>
+              <a:rPr lang="en-US" baseline="0" dirty="0" smtClean="0"/>
+              <a:t> het </a:t>
+            </a:r>
+            <a:r>
+              <a:rPr lang="en-US" baseline="0" dirty="0" err="1" smtClean="0"/>
+              <a:t>zijn</a:t>
+            </a:r>
+            <a:r>
+              <a:rPr lang="en-US" baseline="0" dirty="0" smtClean="0"/>
+              <a:t> </a:t>
+            </a:r>
+            <a:r>
+              <a:rPr lang="en-US" baseline="0" dirty="0" err="1" smtClean="0"/>
+              <a:t>dat</a:t>
+            </a:r>
+            <a:r>
+              <a:rPr lang="en-US" baseline="0" dirty="0" smtClean="0"/>
+              <a:t> de </a:t>
+            </a:r>
+            <a:r>
+              <a:rPr lang="en-US" baseline="0" dirty="0" err="1" smtClean="0"/>
+              <a:t>hypothese</a:t>
+            </a:r>
+            <a:r>
+              <a:rPr lang="en-US" baseline="0" dirty="0" smtClean="0"/>
+              <a:t> </a:t>
+            </a:r>
+            <a:r>
+              <a:rPr lang="en-US" baseline="0" dirty="0" err="1" smtClean="0"/>
+              <a:t>kan</a:t>
+            </a:r>
+            <a:r>
+              <a:rPr lang="en-US" baseline="0" dirty="0" smtClean="0"/>
+              <a:t> </a:t>
+            </a:r>
+            <a:r>
+              <a:rPr lang="en-US" baseline="0" dirty="0" err="1" smtClean="0"/>
+              <a:t>veranderen</a:t>
+            </a:r>
+            <a:r>
+              <a:rPr lang="en-US" baseline="0" dirty="0" smtClean="0"/>
+              <a:t> </a:t>
+            </a:r>
+            <a:r>
+              <a:rPr lang="en-US" baseline="0" dirty="0" err="1" smtClean="0"/>
+              <a:t>naar</a:t>
+            </a:r>
+            <a:r>
+              <a:rPr lang="en-US" baseline="0" dirty="0" smtClean="0"/>
+              <a:t> </a:t>
+            </a:r>
+            <a:r>
+              <a:rPr lang="en-US" baseline="0" dirty="0" err="1" smtClean="0"/>
+              <a:t>gelang</a:t>
+            </a:r>
+            <a:r>
+              <a:rPr lang="en-US" baseline="0" dirty="0" smtClean="0"/>
+              <a:t> de </a:t>
+            </a:r>
+            <a:r>
+              <a:rPr lang="en-US" baseline="0" dirty="0" err="1" smtClean="0"/>
+              <a:t>uitkomst</a:t>
+            </a:r>
+            <a:r>
+              <a:rPr lang="en-US" baseline="0" dirty="0" smtClean="0"/>
+              <a:t> van de </a:t>
+            </a:r>
+            <a:r>
+              <a:rPr lang="en-US" baseline="0" dirty="0" err="1" smtClean="0"/>
+              <a:t>evaluatie</a:t>
+            </a:r>
+            <a:r>
+              <a:rPr lang="en-US" baseline="0" dirty="0" smtClean="0"/>
+              <a:t> criteria.</a:t>
+            </a:r>
+            <a:endParaRPr lang="en-US" dirty="0" smtClean="0"/>
           </a:p>
           <a:p>
             <a:endParaRPr lang="en-US" dirty="0"/>
@@ -1054,23 +1450,7 @@
             </a:r>
             <a:r>
               <a:rPr lang="en-US" baseline="0" dirty="0" smtClean="0"/>
-              <a:t> </a:t>
-            </a:r>
-            <a:r>
-              <a:rPr lang="en-US" baseline="0" dirty="0" err="1" smtClean="0"/>
-              <a:t>wordt</a:t>
-            </a:r>
-            <a:r>
-              <a:rPr lang="en-US" baseline="0" dirty="0" smtClean="0"/>
-              <a:t> </a:t>
-            </a:r>
-            <a:r>
-              <a:rPr lang="en-US" baseline="0" dirty="0" err="1" smtClean="0"/>
-              <a:t>er</a:t>
-            </a:r>
-            <a:r>
-              <a:rPr lang="en-US" baseline="0" dirty="0" smtClean="0"/>
-              <a:t> </a:t>
+              <a:t> wordt er </a:t>
             </a:r>
             <a:r>
               <a:rPr lang="en-US" baseline="0" dirty="0" err="1" smtClean="0"/>
@@ -1360,15 +1740,7 @@
             </a:r>
             <a:r>
               <a:rPr lang="en-US" baseline="0" dirty="0" smtClean="0"/>
-              <a:t> </a:t>
-            </a:r>
-            <a:r>
-              <a:rPr lang="en-US" baseline="0" dirty="0" err="1" smtClean="0"/>
-              <a:t>aan</a:t>
-            </a:r>
-            <a:r>
-              <a:rPr lang="en-US" baseline="0" dirty="0" smtClean="0"/>
-              <a:t> </a:t>
+              <a:t> aan </a:t>
             </a:r>
             <a:r>
               <a:rPr lang="en-US" baseline="0" dirty="0" err="1" smtClean="0"/>
@@ -1667,15 +2039,7 @@
             </a:r>
             <a:r>
               <a:rPr lang="en-US" baseline="0" dirty="0" smtClean="0"/>
-              <a:t> </a:t>
-            </a:r>
-            <a:r>
-              <a:rPr lang="en-US" baseline="0" dirty="0" err="1" smtClean="0"/>
-              <a:t>als</a:t>
-            </a:r>
-            <a:r>
-              <a:rPr lang="en-US" baseline="0" dirty="0" smtClean="0"/>
-              <a:t> in de tools en features </a:t>
+              <a:t> als in de tools en features </a:t>
             </a:r>
             <a:r>
               <a:rPr lang="en-US" baseline="0" dirty="0" err="1" smtClean="0"/>
@@ -2382,15 +2746,7 @@
             </a:r>
             <a:r>
               <a:rPr lang="en-US" baseline="0" dirty="0" smtClean="0"/>
-              <a:t> tools </a:t>
-            </a:r>
-            <a:r>
-              <a:rPr lang="en-US" baseline="0" dirty="0" err="1" smtClean="0"/>
-              <a:t>er</a:t>
-            </a:r>
-            <a:r>
-              <a:rPr lang="en-US" baseline="0" dirty="0" smtClean="0"/>
-              <a:t> </a:t>
+              <a:t> tools er </a:t>
             </a:r>
             <a:r>
               <a:rPr lang="en-US" baseline="0" dirty="0" err="1" smtClean="0"/>
@@ -2742,23 +3098,7 @@
             </a:r>
             <a:r>
               <a:rPr lang="en-US" baseline="0" dirty="0" smtClean="0"/>
-              <a:t>. </a:t>
-            </a:r>
-            <a:r>
-              <a:rPr lang="en-US" baseline="0" dirty="0" err="1" smtClean="0"/>
-              <a:t>Als</a:t>
-            </a:r>
-            <a:r>
-              <a:rPr lang="en-US" baseline="0" dirty="0" smtClean="0"/>
-              <a:t> </a:t>
-            </a:r>
-            <a:r>
-              <a:rPr lang="en-US" baseline="0" dirty="0" err="1" smtClean="0"/>
-              <a:t>er</a:t>
-            </a:r>
-            <a:r>
-              <a:rPr lang="en-US" baseline="0" dirty="0" smtClean="0"/>
-              <a:t> </a:t>
+              <a:t>. Als er </a:t>
             </a:r>
             <a:r>
               <a:rPr lang="en-US" baseline="0" dirty="0" err="1" smtClean="0"/>
@@ -3296,15 +3636,7 @@
             </a:r>
             <a:r>
               <a:rPr lang="en-US" dirty="0" smtClean="0"/>
-              <a:t> </a:t>
-            </a:r>
-            <a:r>
-              <a:rPr lang="en-US" dirty="0" err="1" smtClean="0"/>
-              <a:t>er</a:t>
-            </a:r>
-            <a:r>
-              <a:rPr lang="en-US" dirty="0" smtClean="0"/>
-              <a:t> 2 </a:t>
+              <a:t> er 2 </a:t>
             </a:r>
             <a:r>
               <a:rPr lang="en-US" dirty="0" err="1" smtClean="0"/>
@@ -3336,15 +3668,7 @@
             </a:r>
             <a:r>
               <a:rPr lang="en-US" dirty="0" smtClean="0"/>
-              <a:t> </a:t>
-            </a:r>
-            <a:r>
-              <a:rPr lang="en-US" dirty="0" err="1" smtClean="0"/>
-              <a:t>er</a:t>
-            </a:r>
-            <a:r>
-              <a:rPr lang="en-US" dirty="0" smtClean="0"/>
-              <a:t> op </a:t>
+              <a:t> er op </a:t>
             </a:r>
             <a:r>
               <a:rPr lang="en-US" dirty="0" err="1" smtClean="0"/>
@@ -3360,23 +3684,7 @@
             </a:r>
             <a:r>
               <a:rPr lang="en-US" dirty="0" smtClean="0"/>
-              <a:t> </a:t>
-            </a:r>
-            <a:r>
-              <a:rPr lang="en-US" dirty="0" err="1" smtClean="0"/>
-              <a:t>wordt</a:t>
-            </a:r>
-            <a:r>
-              <a:rPr lang="en-US" dirty="0" smtClean="0"/>
-              <a:t> </a:t>
-            </a:r>
-            <a:r>
-              <a:rPr lang="en-US" dirty="0" err="1" smtClean="0"/>
-              <a:t>gedrukt</a:t>
-            </a:r>
-            <a:r>
-              <a:rPr lang="en-US" dirty="0" smtClean="0"/>
-              <a:t> is </a:t>
+              <a:t> wordt gedrukt is </a:t>
             </a:r>
             <a:r>
               <a:rPr lang="en-US" dirty="0" err="1" smtClean="0"/>
@@ -3424,23 +3732,7 @@
             </a:r>
             <a:r>
               <a:rPr lang="en-US" baseline="0" dirty="0" smtClean="0"/>
-              <a:t>. Maar </a:t>
-            </a:r>
-            <a:r>
-              <a:rPr lang="en-US" baseline="0" dirty="0" err="1" smtClean="0"/>
-              <a:t>als</a:t>
-            </a:r>
-            <a:r>
-              <a:rPr lang="en-US" baseline="0" dirty="0" smtClean="0"/>
-              <a:t> </a:t>
-            </a:r>
-            <a:r>
-              <a:rPr lang="en-US" baseline="0" dirty="0" err="1" smtClean="0"/>
-              <a:t>er</a:t>
-            </a:r>
-            <a:r>
-              <a:rPr lang="en-US" baseline="0" dirty="0" smtClean="0"/>
-              <a:t> </a:t>
+              <a:t>. Maar als er </a:t>
             </a:r>
             <a:r>
               <a:rPr lang="en-US" baseline="0" dirty="0" err="1" smtClean="0"/>
@@ -3645,15 +3937,7 @@
             </a:r>
             <a:r>
               <a:rPr lang="en-US" baseline="0" dirty="0" smtClean="0"/>
-              <a:t> </a:t>
-            </a:r>
-            <a:r>
-              <a:rPr lang="en-US" baseline="0" dirty="0" err="1" smtClean="0"/>
-              <a:t>distributie</a:t>
-            </a:r>
-            <a:r>
-              <a:rPr lang="en-US" baseline="0" dirty="0" smtClean="0"/>
-              <a:t> is het </a:t>
+              <a:t> distributie is het </a:t>
             </a:r>
             <a:r>
               <a:rPr lang="en-US" baseline="0" dirty="0" err="1" smtClean="0"/>
@@ -3693,15 +3977,7 @@
             </a:r>
             <a:r>
               <a:rPr lang="en-US" baseline="0" dirty="0" smtClean="0"/>
-              <a:t> </a:t>
-            </a:r>
-            <a:r>
-              <a:rPr lang="en-US" baseline="0" dirty="0" err="1" smtClean="0"/>
-              <a:t>er</a:t>
-            </a:r>
-            <a:r>
-              <a:rPr lang="en-US" baseline="0" dirty="0" smtClean="0"/>
-              <a:t> op </a:t>
+              <a:t> er op </a:t>
             </a:r>
             <a:r>
               <a:rPr lang="en-US" baseline="0" dirty="0" err="1" smtClean="0"/>
@@ -3717,23 +3993,7 @@
             </a:r>
             <a:r>
               <a:rPr lang="en-US" baseline="0" dirty="0" smtClean="0"/>
-              <a:t> </a:t>
-            </a:r>
-            <a:r>
-              <a:rPr lang="en-US" baseline="0" dirty="0" err="1" smtClean="0"/>
-              <a:t>wordt</a:t>
-            </a:r>
-            <a:r>
-              <a:rPr lang="en-US" baseline="0" dirty="0" smtClean="0"/>
-              <a:t> </a:t>
-            </a:r>
-            <a:r>
-              <a:rPr lang="en-US" baseline="0" dirty="0" err="1" smtClean="0"/>
-              <a:t>gedrukt</a:t>
-            </a:r>
-            <a:r>
-              <a:rPr lang="en-US" baseline="0" dirty="0" smtClean="0"/>
-              <a:t>. </a:t>
+              <a:t> wordt gedrukt. </a:t>
             </a:r>
             <a:r>
               <a:rPr lang="en-US" baseline="0" dirty="0" err="1" smtClean="0"/>
@@ -3741,15 +4001,7 @@
             </a:r>
             <a:r>
               <a:rPr lang="en-US" baseline="0" dirty="0" smtClean="0"/>
-              <a:t> </a:t>
-            </a:r>
-            <a:r>
-              <a:rPr lang="en-US" baseline="0" dirty="0" err="1" smtClean="0"/>
-              <a:t>distributie</a:t>
-            </a:r>
-            <a:r>
-              <a:rPr lang="en-US" baseline="0" dirty="0" smtClean="0"/>
-              <a:t> is </a:t>
+              <a:t> distributie is </a:t>
             </a:r>
             <a:r>
               <a:rPr lang="en-US" baseline="0" dirty="0" err="1" smtClean="0"/>
@@ -3765,15 +4017,7 @@
             </a:r>
             <a:r>
               <a:rPr lang="en-US" baseline="0" dirty="0" smtClean="0"/>
-              <a:t> </a:t>
-            </a:r>
-            <a:r>
-              <a:rPr lang="en-US" baseline="0" dirty="0" err="1" smtClean="0"/>
-              <a:t>distributie</a:t>
-            </a:r>
-            <a:r>
-              <a:rPr lang="en-US" baseline="0" dirty="0" smtClean="0"/>
-              <a:t> </a:t>
+              <a:t> distributie </a:t>
             </a:r>
             <a:r>
               <a:rPr lang="en-US" baseline="0" dirty="0" err="1" smtClean="0"/>
@@ -3797,55 +4041,7 @@
             </a:r>
             <a:r>
               <a:rPr lang="en-US" baseline="0" dirty="0" smtClean="0"/>
-              <a:t> </a:t>
-            </a:r>
-            <a:r>
-              <a:rPr lang="en-US" baseline="0" dirty="0" err="1" smtClean="0"/>
-              <a:t>kleur</a:t>
-            </a:r>
-            <a:r>
-              <a:rPr lang="en-US" baseline="0" dirty="0" smtClean="0"/>
-              <a:t> </a:t>
-            </a:r>
-            <a:r>
-              <a:rPr lang="en-US" baseline="0" dirty="0" err="1" smtClean="0"/>
-              <a:t>er</a:t>
-            </a:r>
-            <a:r>
-              <a:rPr lang="en-US" baseline="0" dirty="0" smtClean="0"/>
-              <a:t> </a:t>
-            </a:r>
-            <a:r>
-              <a:rPr lang="en-US" baseline="0" dirty="0" err="1" smtClean="0"/>
-              <a:t>verandert</a:t>
-            </a:r>
-            <a:r>
-              <a:rPr lang="en-US" baseline="0" dirty="0" smtClean="0"/>
-              <a:t> </a:t>
-            </a:r>
-            <a:r>
-              <a:rPr lang="en-US" baseline="0" dirty="0" err="1" smtClean="0"/>
-              <a:t>wordt</a:t>
-            </a:r>
-            <a:r>
-              <a:rPr lang="en-US" baseline="0" dirty="0" smtClean="0"/>
-              <a:t> </a:t>
-            </a:r>
-            <a:r>
-              <a:rPr lang="en-US" baseline="0" dirty="0" err="1" smtClean="0"/>
-              <a:t>als</a:t>
-            </a:r>
-            <a:r>
-              <a:rPr lang="en-US" baseline="0" dirty="0" smtClean="0"/>
-              <a:t> </a:t>
-            </a:r>
-            <a:r>
-              <a:rPr lang="en-US" baseline="0" dirty="0" err="1" smtClean="0"/>
-              <a:t>er</a:t>
-            </a:r>
-            <a:r>
-              <a:rPr lang="en-US" baseline="0" dirty="0" smtClean="0"/>
-              <a:t> op </a:t>
+              <a:t> kleur er verandert wordt als er op </a:t>
             </a:r>
             <a:r>
               <a:rPr lang="en-US" baseline="0" dirty="0" err="1" smtClean="0"/>
@@ -3861,15 +4057,7 @@
             </a:r>
             <a:r>
               <a:rPr lang="en-US" baseline="0" dirty="0" smtClean="0"/>
-              <a:t> </a:t>
-            </a:r>
-            <a:r>
-              <a:rPr lang="en-US" baseline="0" dirty="0" err="1" smtClean="0"/>
-              <a:t>gedrukt</a:t>
-            </a:r>
-            <a:r>
-              <a:rPr lang="en-US" baseline="0" dirty="0" smtClean="0"/>
-              <a:t> is.</a:t>
+              <a:t> gedrukt is.</a:t>
             </a:r>
           </a:p>
         </p:txBody>
@@ -4245,7 +4433,7 @@
   </p:clrMapOvr>
   <p:extLst mod="1">
     <p:ext uri="{DCECCB84-F9BA-43D5-87BE-67443E8EF086}">
-      <p15:sldGuideLst xmlns="" xmlns:p15="http://schemas.microsoft.com/office/powerpoint/2012/main">
+      <p15:sldGuideLst xmlns:p15="http://schemas.microsoft.com/office/powerpoint/2012/main" xmlns="">
         <p15:guide id="1" orient="horz" pos="3929" userDrawn="1">
           <p15:clr>
             <a:srgbClr val="FBAE40"/>
@@ -4556,7 +4744,7 @@
   </p:clrMapOvr>
   <p:extLst mod="1">
     <p:ext uri="{DCECCB84-F9BA-43D5-87BE-67443E8EF086}">
-      <p15:sldGuideLst xmlns="" xmlns:p15="http://schemas.microsoft.com/office/powerpoint/2012/main">
+      <p15:sldGuideLst xmlns:p15="http://schemas.microsoft.com/office/powerpoint/2012/main" xmlns="">
         <p15:guide id="1" orient="horz" pos="3929">
           <p15:clr>
             <a:srgbClr val="FBAE40"/>
@@ -4844,7 +5032,7 @@
           <a:p>
             <a:fld id="{BA252000-72D1-4588-81D0-A21B268C4F60}" type="datetime1">
               <a:rPr lang="nl-BE" smtClean="0"/>
-              <a:t>27/10/2017</a:t>
+              <a:t>18/11/2017</a:t>
             </a:fld>
             <a:endParaRPr lang="nl-NL" dirty="0"/>
           </a:p>
@@ -4909,7 +5097,7 @@
   </p:clrMapOvr>
   <p:extLst mod="1">
     <p:ext uri="{DCECCB84-F9BA-43D5-87BE-67443E8EF086}">
-      <p15:sldGuideLst xmlns="" xmlns:p15="http://schemas.microsoft.com/office/powerpoint/2012/main">
+      <p15:sldGuideLst xmlns:p15="http://schemas.microsoft.com/office/powerpoint/2012/main" xmlns="">
         <p15:guide id="1" orient="horz" pos="2160">
           <p15:clr>
             <a:srgbClr val="FBAE40"/>
@@ -5151,7 +5339,7 @@
           <a:p>
             <a:fld id="{51B5EE41-54AE-48CB-8D18-4748453B9BC8}" type="datetime1">
               <a:rPr lang="nl-BE" smtClean="0"/>
-              <a:t>27/10/2017</a:t>
+              <a:t>18/11/2017</a:t>
             </a:fld>
             <a:endParaRPr lang="nl-NL" dirty="0"/>
           </a:p>
@@ -5216,7 +5404,7 @@
   </p:clrMapOvr>
   <p:extLst mod="1">
     <p:ext uri="{DCECCB84-F9BA-43D5-87BE-67443E8EF086}">
-      <p15:sldGuideLst xmlns="" xmlns:p15="http://schemas.microsoft.com/office/powerpoint/2012/main">
+      <p15:sldGuideLst xmlns:p15="http://schemas.microsoft.com/office/powerpoint/2012/main" xmlns="">
         <p15:guide id="1" orient="horz" pos="2160">
           <p15:clr>
             <a:srgbClr val="FBAE40"/>
@@ -5267,7 +5455,7 @@
           <a:p>
             <a:fld id="{325CFB26-3E0B-43F3-B1DB-8FF4C39B3D0D}" type="datetime1">
               <a:rPr lang="nl-BE" smtClean="0"/>
-              <a:t>27/10/2017</a:t>
+              <a:t>18/11/2017</a:t>
             </a:fld>
             <a:endParaRPr lang="nl-NL" dirty="0"/>
           </a:p>
@@ -5657,7 +5845,7 @@
           <a:p>
             <a:fld id="{DC4FC34B-922A-43D1-878B-5EF44FE511A8}" type="datetime1">
               <a:rPr lang="nl-BE" smtClean="0"/>
-              <a:t>27/10/2017</a:t>
+              <a:t>18/11/2017</a:t>
             </a:fld>
             <a:endParaRPr lang="nl-NL" dirty="0"/>
           </a:p>
@@ -5776,7 +5964,7 @@
   </p:clrMapOvr>
   <p:extLst mod="1">
     <p:ext uri="{DCECCB84-F9BA-43D5-87BE-67443E8EF086}">
-      <p15:sldGuideLst xmlns="" xmlns:p15="http://schemas.microsoft.com/office/powerpoint/2012/main">
+      <p15:sldGuideLst xmlns:p15="http://schemas.microsoft.com/office/powerpoint/2012/main" xmlns="">
         <p15:guide id="1" orient="horz" pos="2160" userDrawn="1">
           <p15:clr>
             <a:srgbClr val="FBAE40"/>
@@ -5988,7 +6176,7 @@
           <a:p>
             <a:fld id="{FD918A91-1924-4471-9808-ACB04D0ED8EA}" type="datetime1">
               <a:rPr lang="nl-BE" smtClean="0"/>
-              <a:t>27/10/2017</a:t>
+              <a:t>18/11/2017</a:t>
             </a:fld>
             <a:endParaRPr lang="nl-NL" dirty="0"/>
           </a:p>
@@ -6107,7 +6295,7 @@
   </p:clrMapOvr>
   <p:extLst mod="1">
     <p:ext uri="{DCECCB84-F9BA-43D5-87BE-67443E8EF086}">
-      <p15:sldGuideLst xmlns="" xmlns:p15="http://schemas.microsoft.com/office/powerpoint/2012/main">
+      <p15:sldGuideLst xmlns:p15="http://schemas.microsoft.com/office/powerpoint/2012/main" xmlns="">
         <p15:guide id="1" orient="horz" pos="2160" userDrawn="1">
           <p15:clr>
             <a:srgbClr val="FBAE40"/>
@@ -6278,7 +6466,7 @@
           <a:p>
             <a:fld id="{EA5FBAB9-5FA3-46D6-A3EF-8850D13E3E94}" type="datetime1">
               <a:rPr lang="nl-BE" smtClean="0"/>
-              <a:t>27/10/2017</a:t>
+              <a:t>18/11/2017</a:t>
             </a:fld>
             <a:endParaRPr lang="nl-NL" dirty="0"/>
           </a:p>
@@ -6657,7 +6845,7 @@
           <a:p>
             <a:fld id="{D02784A5-45C8-4246-ADE0-8842E3C66E5D}" type="datetime1">
               <a:rPr lang="nl-BE" smtClean="0"/>
-              <a:t>27/10/2017</a:t>
+              <a:t>18/11/2017</a:t>
             </a:fld>
             <a:endParaRPr lang="nl-NL" dirty="0"/>
           </a:p>
@@ -6780,7 +6968,7 @@
           <a:p>
             <a:fld id="{C477E6CE-7017-4F77-9645-5F8638D9B9E2}" type="datetime1">
               <a:rPr lang="nl-BE" smtClean="0"/>
-              <a:t>27/10/2017</a:t>
+              <a:t>18/11/2017</a:t>
             </a:fld>
             <a:endParaRPr lang="nl-NL" dirty="0"/>
           </a:p>
@@ -6903,7 +7091,7 @@
           <a:p>
             <a:fld id="{56055E81-6827-4C1D-AD12-F50C5BE907ED}" type="datetime1">
               <a:rPr lang="nl-BE" smtClean="0"/>
-              <a:t>27/10/2017</a:t>
+              <a:t>18/11/2017</a:t>
             </a:fld>
             <a:endParaRPr lang="nl-NL" dirty="0"/>
           </a:p>
@@ -7052,7 +7240,7 @@
           <a:p>
             <a:fld id="{F7042BA5-0515-4B7F-B8A4-B74FD521147B}" type="datetime1">
               <a:rPr lang="nl-BE" smtClean="0"/>
-              <a:t>27/10/2017</a:t>
+              <a:t>18/11/2017</a:t>
             </a:fld>
             <a:endParaRPr lang="nl-NL" dirty="0"/>
           </a:p>
@@ -7220,7 +7408,7 @@
           <a:p>
             <a:fld id="{09EF3F9E-B585-4D67-B28C-5D7ABCECB608}" type="datetime1">
               <a:rPr lang="nl-BE" smtClean="0"/>
-              <a:t>27/10/2017</a:t>
+              <a:t>18/11/2017</a:t>
             </a:fld>
             <a:endParaRPr lang="nl-NL" dirty="0"/>
           </a:p>
@@ -7734,7 +7922,7 @@
   </p:txStyles>
   <p:extLst mod="1">
     <p:ext uri="{27BBF7A9-308A-43DC-89C8-2F10F3537804}">
-      <p15:sldGuideLst xmlns="" xmlns:p15="http://schemas.microsoft.com/office/powerpoint/2012/main">
+      <p15:sldGuideLst xmlns:p15="http://schemas.microsoft.com/office/powerpoint/2012/main" xmlns="">
         <p15:guide id="1" orient="horz" pos="3816" userDrawn="1">
           <p15:clr>
             <a:srgbClr val="F26B43"/>
@@ -7858,7 +8046,7 @@
           <a:p>
             <a:fld id="{15BE6352-CF92-4CB8-B2C0-9F716CAEF608}" type="datetime1">
               <a:rPr lang="nl-BE" smtClean="0"/>
-              <a:t>27/10/2017</a:t>
+              <a:t>18/11/2017</a:t>
             </a:fld>
             <a:endParaRPr lang="nl-NL" dirty="0"/>
           </a:p>
@@ -8366,7 +8554,7 @@
   </p:txStyles>
   <p:extLst mod="1">
     <p:ext uri="{27BBF7A9-308A-43DC-89C8-2F10F3537804}">
-      <p15:sldGuideLst xmlns="" xmlns:p15="http://schemas.microsoft.com/office/powerpoint/2012/main">
+      <p15:sldGuideLst xmlns:p15="http://schemas.microsoft.com/office/powerpoint/2012/main" xmlns="">
         <p15:guide id="1" orient="horz" pos="1026" userDrawn="1">
           <p15:clr>
             <a:srgbClr val="F26B43"/>
@@ -8739,15 +8927,7 @@
             </a:r>
             <a:r>
               <a:rPr lang="en-US" dirty="0"/>
-              <a:t> </a:t>
-            </a:r>
-            <a:r>
-              <a:rPr lang="en-US" dirty="0" err="1"/>
-              <a:t>als</a:t>
-            </a:r>
-            <a:r>
-              <a:rPr lang="en-US" dirty="0"/>
-              <a:t> </a:t>
+              <a:t> als </a:t>
             </a:r>
             <a:r>
               <a:rPr lang="en-US" dirty="0" err="1"/>
@@ -10207,48 +10387,8 @@
               <a:t>Blok </a:t>
             </a:r>
             <a:r>
-              <a:rPr lang="en-US" dirty="0" err="1"/>
-              <a:t>verandert</a:t>
-            </a:r>
-            <a:r>
               <a:rPr lang="en-US" dirty="0"/>
-              <a:t> van </a:t>
-            </a:r>
-            <a:r>
-              <a:rPr lang="en-US" dirty="0" err="1"/>
-              <a:t>kleur</a:t>
-            </a:r>
-            <a:r>
-              <a:rPr lang="en-US" dirty="0"/>
-              <a:t> </a:t>
-            </a:r>
-            <a:r>
-              <a:rPr lang="en-US" dirty="0" err="1"/>
-              <a:t>als</a:t>
-            </a:r>
-            <a:r>
-              <a:rPr lang="en-US" dirty="0"/>
-              <a:t> </a:t>
-            </a:r>
-            <a:r>
-              <a:rPr lang="en-US" dirty="0" err="1"/>
-              <a:t>er</a:t>
-            </a:r>
-            <a:r>
-              <a:rPr lang="en-US" dirty="0"/>
-              <a:t> op </a:t>
-            </a:r>
-            <a:r>
-              <a:rPr lang="en-US" dirty="0" err="1"/>
-              <a:t>gedrukt</a:t>
-            </a:r>
-            <a:r>
-              <a:rPr lang="en-US" dirty="0"/>
-              <a:t> </a:t>
-            </a:r>
-            <a:r>
-              <a:rPr lang="en-US" dirty="0" err="1"/>
-              <a:t>wordt</a:t>
+              <a:t>verandert van kleur als er op gedrukt wordt</a:t>
             </a:r>
             <a:r>
               <a:rPr lang="en-US" dirty="0" smtClean="0"/>
@@ -10257,44 +10397,8 @@
           </a:p>
           <a:p>
             <a:r>
-              <a:rPr lang="en-US" dirty="0" err="1"/>
-              <a:t>Volgende</a:t>
-            </a:r>
-            <a:r>
               <a:rPr lang="en-US" dirty="0"/>
-              <a:t> </a:t>
-            </a:r>
-            <a:r>
-              <a:rPr lang="en-US" dirty="0" err="1"/>
-              <a:t>kleur</a:t>
-            </a:r>
-            <a:r>
-              <a:rPr lang="en-US" dirty="0"/>
-              <a:t> </a:t>
-            </a:r>
-            <a:r>
-              <a:rPr lang="en-US" dirty="0" err="1"/>
-              <a:t>aan</a:t>
-            </a:r>
-            <a:r>
-              <a:rPr lang="en-US" dirty="0"/>
-              <a:t> de hand van </a:t>
-            </a:r>
-            <a:r>
-              <a:rPr lang="en-US" dirty="0" err="1"/>
-              <a:t>probabiliteits</a:t>
-            </a:r>
-            <a:r>
-              <a:rPr lang="en-US" dirty="0"/>
-              <a:t> </a:t>
-            </a:r>
-            <a:r>
-              <a:rPr lang="en-US" dirty="0" err="1"/>
-              <a:t>distributie</a:t>
-            </a:r>
-            <a:r>
-              <a:rPr lang="en-US" dirty="0"/>
-              <a:t>.</a:t>
+              <a:t>Volgende kleur aan de hand van probabiliteits distributie.</a:t>
             </a:r>
           </a:p>
           <a:p>
@@ -10318,7 +10422,7 @@
           <a:lstStyle/>
           <a:p>
             <a:r>
-              <a:rPr lang="en-US" dirty="0" err="1"/>
+              <a:rPr lang="en-US" dirty="0"/>
               <a:t>Spel</a:t>
             </a:r>
             <a:endParaRPr lang="en-US" dirty="0"/>
@@ -10561,15 +10665,13 @@
       <p:cxnSp>
         <p:nvCxnSpPr>
           <p:cNvPr id="8" name="Straight Arrow Connector 7"/>
-          <p:cNvCxnSpPr>
-            <a:endCxn id="2051" idx="0"/>
-          </p:cNvCxnSpPr>
+          <p:cNvCxnSpPr/>
           <p:nvPr/>
         </p:nvCxnSpPr>
         <p:spPr>
           <a:xfrm flipH="1">
-            <a:off x="2779419" y="4072958"/>
-            <a:ext cx="1188693" cy="603668"/>
+            <a:off x="3298341" y="4072958"/>
+            <a:ext cx="669772" cy="603668"/>
           </a:xfrm>
           <a:prstGeom prst="straightConnector1">
             <a:avLst/>
@@ -10632,15 +10734,13 @@
       <p:cxnSp>
         <p:nvCxnSpPr>
           <p:cNvPr id="12" name="Straight Arrow Connector 11"/>
-          <p:cNvCxnSpPr>
-            <a:endCxn id="2052" idx="0"/>
-          </p:cNvCxnSpPr>
+          <p:cNvCxnSpPr/>
           <p:nvPr/>
         </p:nvCxnSpPr>
         <p:spPr>
           <a:xfrm>
             <a:off x="5005955" y="4072958"/>
-            <a:ext cx="1186434" cy="603668"/>
+            <a:ext cx="667512" cy="603668"/>
           </a:xfrm>
           <a:prstGeom prst="straightConnector1">
             <a:avLst/>
@@ -10672,7 +10772,7 @@
         </p:nvSpPr>
         <p:spPr>
           <a:xfrm>
-            <a:off x="1892057" y="3983589"/>
+            <a:off x="2071581" y="4158665"/>
             <a:ext cx="1561646" cy="307777"/>
           </a:xfrm>
           <a:prstGeom prst="rect">
@@ -10687,15 +10787,11 @@
           <a:lstStyle/>
           <a:p>
             <a:r>
-              <a:rPr lang="en-US" sz="1400" i="1" dirty="0" err="1" smtClean="0"/>
-              <a:t>Kleur</a:t>
-            </a:r>
-            <a:r>
               <a:rPr lang="en-US" sz="1400" i="1" dirty="0" smtClean="0"/>
-              <a:t> = </a:t>
-            </a:r>
-            <a:r>
-              <a:rPr lang="en-US" sz="1400" i="1" dirty="0" err="1" smtClean="0"/>
+              <a:t>Kleur = </a:t>
+            </a:r>
+            <a:r>
+              <a:rPr lang="en-US" sz="1400" i="1" dirty="0" smtClean="0"/>
               <a:t>geel</a:t>
             </a:r>
             <a:r>
@@ -10736,12 +10832,8 @@
           <a:lstStyle/>
           <a:p>
             <a:r>
-              <a:rPr lang="en-US" sz="1400" i="1" dirty="0" err="1" smtClean="0"/>
-              <a:t>Kleur</a:t>
-            </a:r>
-            <a:r>
               <a:rPr lang="en-US" sz="1400" i="1" dirty="0" smtClean="0"/>
-              <a:t> = rood </a:t>
+              <a:t>Kleur = rood </a:t>
             </a:r>
             <a:r>
               <a:rPr lang="en-US" sz="1400" i="1" dirty="0"/>
@@ -10762,7 +10854,7 @@
         </p:nvSpPr>
         <p:spPr>
           <a:xfrm>
-            <a:off x="5453765" y="3983590"/>
+            <a:off x="5323251" y="4137478"/>
             <a:ext cx="1680268" cy="307777"/>
           </a:xfrm>
           <a:prstGeom prst="rect">
@@ -10777,15 +10869,11 @@
           <a:lstStyle/>
           <a:p>
             <a:r>
-              <a:rPr lang="en-US" sz="1400" i="1" dirty="0" err="1" smtClean="0"/>
-              <a:t>Kleur</a:t>
-            </a:r>
-            <a:r>
               <a:rPr lang="en-US" sz="1400" i="1" dirty="0" smtClean="0"/>
-              <a:t> = </a:t>
-            </a:r>
-            <a:r>
-              <a:rPr lang="en-US" sz="1400" i="1" dirty="0" err="1" smtClean="0"/>
+              <a:t>Kleur = </a:t>
+            </a:r>
+            <a:r>
+              <a:rPr lang="en-US" sz="1400" i="1" dirty="0" smtClean="0"/>
               <a:t>groen</a:t>
             </a:r>
             <a:r>
@@ -10918,15 +11006,11 @@
           <a:lstStyle/>
           <a:p>
             <a:r>
-              <a:rPr lang="en-US" sz="1400" i="1" dirty="0" err="1" smtClean="0"/>
-              <a:t>Kleur</a:t>
-            </a:r>
-            <a:r>
               <a:rPr lang="en-US" sz="1400" i="1" dirty="0" smtClean="0"/>
-              <a:t> = </a:t>
-            </a:r>
-            <a:r>
-              <a:rPr lang="en-US" sz="1400" i="1" dirty="0" err="1" smtClean="0"/>
+              <a:t>Kleur = </a:t>
+            </a:r>
+            <a:r>
+              <a:rPr lang="en-US" sz="1400" i="1" dirty="0" smtClean="0"/>
               <a:t>blauw</a:t>
             </a:r>
             <a:r>
@@ -10980,7 +11064,7 @@
           <a:lstStyle/>
           <a:p>
             <a:pPr algn="ctr"/>
-            <a:endParaRPr lang="en-US"/>
+            <a:endParaRPr lang="en-US" dirty="0"/>
           </a:p>
         </p:txBody>
       </p:sp>
@@ -11008,13 +11092,14 @@
           <a:p>
             <a:r>
               <a:rPr lang="en-US" dirty="0" smtClean="0"/>
-              <a:t>X=2</a:t>
-            </a:r>
+              <a:t>X=1</a:t>
+            </a:r>
+            <a:endParaRPr lang="en-US" dirty="0" smtClean="0"/>
           </a:p>
           <a:p>
             <a:r>
               <a:rPr lang="en-US" dirty="0" smtClean="0"/>
-              <a:t>Y=2</a:t>
+              <a:t>Y=1</a:t>
             </a:r>
             <a:endParaRPr lang="en-US" dirty="0"/>
           </a:p>
@@ -11043,8 +11128,12 @@
           <a:lstStyle/>
           <a:p>
             <a:r>
+              <a:rPr lang="en-US" dirty="0"/>
+              <a:t>0</a:t>
+            </a:r>
+            <a:r>
               <a:rPr lang="en-US" dirty="0" smtClean="0"/>
-              <a:t>1    2   3</a:t>
+              <a:t>    1   2</a:t>
             </a:r>
             <a:endParaRPr lang="en-US" dirty="0"/>
           </a:p>
@@ -11073,20 +11162,22 @@
           <a:lstStyle/>
           <a:p>
             <a:r>
+              <a:rPr lang="en-US" dirty="0"/>
+              <a:t>2</a:t>
+            </a:r>
+            <a:endParaRPr lang="en-US" dirty="0" smtClean="0"/>
+          </a:p>
+          <a:p>
+            <a:r>
+              <a:rPr lang="en-US" dirty="0"/>
+              <a:t>1</a:t>
+            </a:r>
+            <a:endParaRPr lang="en-US" dirty="0" smtClean="0"/>
+          </a:p>
+          <a:p>
+            <a:r>
               <a:rPr lang="en-US" dirty="0" smtClean="0"/>
-              <a:t>1</a:t>
-            </a:r>
-          </a:p>
-          <a:p>
-            <a:r>
-              <a:rPr lang="en-US" dirty="0" smtClean="0"/>
-              <a:t>2</a:t>
-            </a:r>
-          </a:p>
-          <a:p>
-            <a:r>
-              <a:rPr lang="en-US" dirty="0" smtClean="0"/>
-              <a:t>3</a:t>
+              <a:t>0</a:t>
             </a:r>
             <a:endParaRPr lang="en-US" dirty="0"/>
           </a:p>
@@ -11272,15 +11363,7 @@
             </a:r>
             <a:r>
               <a:rPr lang="en-US" dirty="0"/>
-              <a:t> </a:t>
-            </a:r>
-            <a:r>
-              <a:rPr lang="en-US" dirty="0" err="1"/>
-              <a:t>aan</a:t>
-            </a:r>
-            <a:r>
-              <a:rPr lang="en-US" dirty="0"/>
-              <a:t> de hand van </a:t>
+              <a:t> aan de hand van </a:t>
             </a:r>
             <a:r>
               <a:rPr lang="en-US" dirty="0" err="1"/>
@@ -11296,15 +11379,7 @@
             </a:r>
             <a:r>
               <a:rPr lang="en-US" dirty="0"/>
-              <a:t> </a:t>
-            </a:r>
-            <a:r>
-              <a:rPr lang="en-US" dirty="0" err="1"/>
-              <a:t>er</a:t>
-            </a:r>
-            <a:r>
-              <a:rPr lang="en-US" dirty="0"/>
-              <a:t> </a:t>
+              <a:t> er </a:t>
             </a:r>
             <a:r>
               <a:rPr lang="en-US" dirty="0" err="1" smtClean="0"/>
@@ -11899,15 +11974,7 @@
             </a:r>
             <a:r>
               <a:rPr lang="en-US" dirty="0" smtClean="0"/>
-              <a:t> </a:t>
-            </a:r>
-            <a:r>
-              <a:rPr lang="en-US" dirty="0" err="1" smtClean="0"/>
-              <a:t>er</a:t>
-            </a:r>
-            <a:r>
-              <a:rPr lang="en-US" dirty="0" smtClean="0"/>
-              <a:t> op </a:t>
+              <a:t> er op </a:t>
             </a:r>
             <a:r>
               <a:rPr lang="en-US" dirty="0" err="1" smtClean="0"/>
@@ -11923,19 +11990,7 @@
             </a:r>
             <a:r>
               <a:rPr lang="en-US" dirty="0" smtClean="0"/>
-              <a:t> </a:t>
-            </a:r>
-            <a:r>
-              <a:rPr lang="en-US" dirty="0" err="1" smtClean="0"/>
-              <a:t>wordt</a:t>
-            </a:r>
-            <a:r>
-              <a:rPr lang="en-US" dirty="0" smtClean="0"/>
-              <a:t> </a:t>
-            </a:r>
-            <a:r>
-              <a:rPr lang="en-US" dirty="0" err="1" smtClean="0"/>
-              <a:t>gedrukt</a:t>
+              <a:t> wordt gedrukt</a:t>
             </a:r>
             <a:endParaRPr lang="en-US" dirty="0"/>
           </a:p>
@@ -11981,15 +12036,7 @@
             </a:r>
             <a:r>
               <a:rPr lang="en-US" dirty="0" smtClean="0"/>
-              <a:t> </a:t>
-            </a:r>
-            <a:r>
-              <a:rPr lang="en-US" dirty="0" err="1" smtClean="0"/>
-              <a:t>er</a:t>
-            </a:r>
-            <a:r>
-              <a:rPr lang="en-US" dirty="0" smtClean="0"/>
-              <a:t> op </a:t>
+              <a:t> er op </a:t>
             </a:r>
             <a:r>
               <a:rPr lang="en-US" dirty="0" err="1" smtClean="0"/>
@@ -12005,19 +12052,7 @@
             </a:r>
             <a:r>
               <a:rPr lang="en-US" dirty="0" smtClean="0"/>
-              <a:t> </a:t>
-            </a:r>
-            <a:r>
-              <a:rPr lang="en-US" dirty="0" err="1" smtClean="0"/>
-              <a:t>wordt</a:t>
-            </a:r>
-            <a:r>
-              <a:rPr lang="en-US" dirty="0" smtClean="0"/>
-              <a:t> </a:t>
-            </a:r>
-            <a:r>
-              <a:rPr lang="en-US" dirty="0" err="1" smtClean="0"/>
-              <a:t>gedrukt</a:t>
+              <a:t> wordt gedrukt</a:t>
             </a:r>
             <a:endParaRPr lang="en-US" dirty="0"/>
           </a:p>
@@ -12298,7 +12333,7 @@
   <a:extraClrSchemeLst/>
   <a:extLst>
     <a:ext uri="{05A4C25C-085E-4340-85A3-A5531E510DB2}">
-      <thm15:themeFamily xmlns="" xmlns:thm15="http://schemas.microsoft.com/office/thememl/2012/main" name="Office Theme" id="{62F939B6-93AF-4DB8-9C6B-D6C7DFDC589F}" vid="{4A3C46E8-61CC-4603-A589-7422A47A8E4A}"/>
+      <thm15:themeFamily xmlns:thm15="http://schemas.microsoft.com/office/thememl/2012/main" xmlns="" name="Office Theme" id="{62F939B6-93AF-4DB8-9C6B-D6C7DFDC589F}" vid="{4A3C46E8-61CC-4603-A589-7422A47A8E4A}"/>
     </a:ext>
   </a:extLst>
 </a:theme>
@@ -12559,7 +12594,7 @@
   <a:extraClrSchemeLst/>
   <a:extLst>
     <a:ext uri="{05A4C25C-085E-4340-85A3-A5531E510DB2}">
-      <thm15:themeFamily xmlns="" xmlns:thm15="http://schemas.microsoft.com/office/thememl/2012/main" name="Office Theme" id="{62F939B6-93AF-4DB8-9C6B-D6C7DFDC589F}" vid="{4A3C46E8-61CC-4603-A589-7422A47A8E4A}"/>
+      <thm15:themeFamily xmlns:thm15="http://schemas.microsoft.com/office/thememl/2012/main" xmlns="" name="Office Theme" id="{62F939B6-93AF-4DB8-9C6B-D6C7DFDC589F}" vid="{4A3C46E8-61CC-4603-A589-7422A47A8E4A}"/>
     </a:ext>
   </a:extLst>
 </a:theme>
@@ -12820,7 +12855,7 @@
   <a:extraClrSchemeLst/>
   <a:extLst>
     <a:ext uri="{05A4C25C-085E-4340-85A3-A5531E510DB2}">
-      <thm15:themeFamily xmlns="" xmlns:thm15="http://schemas.microsoft.com/office/thememl/2012/main" name="Office Theme" id="{62F939B6-93AF-4DB8-9C6B-D6C7DFDC589F}" vid="{4A3C46E8-61CC-4603-A589-7422A47A8E4A}"/>
+      <thm15:themeFamily xmlns:thm15="http://schemas.microsoft.com/office/thememl/2012/main" xmlns="" name="Office Theme" id="{62F939B6-93AF-4DB8-9C6B-D6C7DFDC589F}" vid="{4A3C46E8-61CC-4603-A589-7422A47A8E4A}"/>
     </a:ext>
   </a:extLst>
 </a:theme>

</xml_diff>